<commit_message>
MOD Application Function PPT
</commit_message>
<xml_diff>
--- a/Document(App)/design.pptx
+++ b/Document(App)/design.pptx
@@ -6,6 +6,8 @@
   </p:sldMasterIdLst>
   <p:sldIdLst>
     <p:sldId id="256" r:id="rId2"/>
+    <p:sldId id="257" r:id="rId3"/>
+    <p:sldId id="258" r:id="rId4"/>
   </p:sldIdLst>
   <p:sldSz cx="12192000" cy="6858000"/>
   <p:notesSz cx="6858000" cy="9144000"/>
@@ -259,7 +261,7 @@
           <a:p>
             <a:fld id="{F1CDBEE2-8AA4-45DB-A1F8-0EF35EA640FF}" type="datetimeFigureOut">
               <a:rPr lang="ko-KR" altLang="en-US" smtClean="0"/>
-              <a:t>2021-11-15</a:t>
+              <a:t>2021-11-17</a:t>
             </a:fld>
             <a:endParaRPr lang="ko-KR" altLang="en-US"/>
           </a:p>
@@ -457,7 +459,7 @@
           <a:p>
             <a:fld id="{F1CDBEE2-8AA4-45DB-A1F8-0EF35EA640FF}" type="datetimeFigureOut">
               <a:rPr lang="ko-KR" altLang="en-US" smtClean="0"/>
-              <a:t>2021-11-15</a:t>
+              <a:t>2021-11-17</a:t>
             </a:fld>
             <a:endParaRPr lang="ko-KR" altLang="en-US"/>
           </a:p>
@@ -665,7 +667,7 @@
           <a:p>
             <a:fld id="{F1CDBEE2-8AA4-45DB-A1F8-0EF35EA640FF}" type="datetimeFigureOut">
               <a:rPr lang="ko-KR" altLang="en-US" smtClean="0"/>
-              <a:t>2021-11-15</a:t>
+              <a:t>2021-11-17</a:t>
             </a:fld>
             <a:endParaRPr lang="ko-KR" altLang="en-US"/>
           </a:p>
@@ -863,7 +865,7 @@
           <a:p>
             <a:fld id="{F1CDBEE2-8AA4-45DB-A1F8-0EF35EA640FF}" type="datetimeFigureOut">
               <a:rPr lang="ko-KR" altLang="en-US" smtClean="0"/>
-              <a:t>2021-11-15</a:t>
+              <a:t>2021-11-17</a:t>
             </a:fld>
             <a:endParaRPr lang="ko-KR" altLang="en-US"/>
           </a:p>
@@ -1138,7 +1140,7 @@
           <a:p>
             <a:fld id="{F1CDBEE2-8AA4-45DB-A1F8-0EF35EA640FF}" type="datetimeFigureOut">
               <a:rPr lang="ko-KR" altLang="en-US" smtClean="0"/>
-              <a:t>2021-11-15</a:t>
+              <a:t>2021-11-17</a:t>
             </a:fld>
             <a:endParaRPr lang="ko-KR" altLang="en-US"/>
           </a:p>
@@ -1403,7 +1405,7 @@
           <a:p>
             <a:fld id="{F1CDBEE2-8AA4-45DB-A1F8-0EF35EA640FF}" type="datetimeFigureOut">
               <a:rPr lang="ko-KR" altLang="en-US" smtClean="0"/>
-              <a:t>2021-11-15</a:t>
+              <a:t>2021-11-17</a:t>
             </a:fld>
             <a:endParaRPr lang="ko-KR" altLang="en-US"/>
           </a:p>
@@ -1815,7 +1817,7 @@
           <a:p>
             <a:fld id="{F1CDBEE2-8AA4-45DB-A1F8-0EF35EA640FF}" type="datetimeFigureOut">
               <a:rPr lang="ko-KR" altLang="en-US" smtClean="0"/>
-              <a:t>2021-11-15</a:t>
+              <a:t>2021-11-17</a:t>
             </a:fld>
             <a:endParaRPr lang="ko-KR" altLang="en-US"/>
           </a:p>
@@ -1956,7 +1958,7 @@
           <a:p>
             <a:fld id="{F1CDBEE2-8AA4-45DB-A1F8-0EF35EA640FF}" type="datetimeFigureOut">
               <a:rPr lang="ko-KR" altLang="en-US" smtClean="0"/>
-              <a:t>2021-11-15</a:t>
+              <a:t>2021-11-17</a:t>
             </a:fld>
             <a:endParaRPr lang="ko-KR" altLang="en-US"/>
           </a:p>
@@ -2069,7 +2071,7 @@
           <a:p>
             <a:fld id="{F1CDBEE2-8AA4-45DB-A1F8-0EF35EA640FF}" type="datetimeFigureOut">
               <a:rPr lang="ko-KR" altLang="en-US" smtClean="0"/>
-              <a:t>2021-11-15</a:t>
+              <a:t>2021-11-17</a:t>
             </a:fld>
             <a:endParaRPr lang="ko-KR" altLang="en-US"/>
           </a:p>
@@ -2380,7 +2382,7 @@
           <a:p>
             <a:fld id="{F1CDBEE2-8AA4-45DB-A1F8-0EF35EA640FF}" type="datetimeFigureOut">
               <a:rPr lang="ko-KR" altLang="en-US" smtClean="0"/>
-              <a:t>2021-11-15</a:t>
+              <a:t>2021-11-17</a:t>
             </a:fld>
             <a:endParaRPr lang="ko-KR" altLang="en-US"/>
           </a:p>
@@ -2668,7 +2670,7 @@
           <a:p>
             <a:fld id="{F1CDBEE2-8AA4-45DB-A1F8-0EF35EA640FF}" type="datetimeFigureOut">
               <a:rPr lang="ko-KR" altLang="en-US" smtClean="0"/>
-              <a:t>2021-11-15</a:t>
+              <a:t>2021-11-17</a:t>
             </a:fld>
             <a:endParaRPr lang="ko-KR" altLang="en-US"/>
           </a:p>
@@ -2909,7 +2911,7 @@
           <a:p>
             <a:fld id="{F1CDBEE2-8AA4-45DB-A1F8-0EF35EA640FF}" type="datetimeFigureOut">
               <a:rPr lang="ko-KR" altLang="en-US" smtClean="0"/>
-              <a:t>2021-11-15</a:t>
+              <a:t>2021-11-17</a:t>
             </a:fld>
             <a:endParaRPr lang="ko-KR" altLang="en-US"/>
           </a:p>
@@ -5703,6 +5705,1086 @@
 </p:sld>
 </file>
 
+<file path=ppt/slides/slide2.xml><?xml version="1.0" encoding="utf-8"?>
+<p:sld xmlns:a="http://schemas.openxmlformats.org/drawingml/2006/main" xmlns:r="http://schemas.openxmlformats.org/officeDocument/2006/relationships" xmlns:p="http://schemas.openxmlformats.org/presentationml/2006/main">
+  <p:cSld>
+    <p:spTree>
+      <p:nvGrpSpPr>
+        <p:cNvPr id="1" name=""/>
+        <p:cNvGrpSpPr/>
+        <p:nvPr/>
+      </p:nvGrpSpPr>
+      <p:grpSpPr>
+        <a:xfrm>
+          <a:off x="0" y="0"/>
+          <a:ext cx="0" cy="0"/>
+          <a:chOff x="0" y="0"/>
+          <a:chExt cx="0" cy="0"/>
+        </a:xfrm>
+      </p:grpSpPr>
+      <p:sp>
+        <p:nvSpPr>
+          <p:cNvPr id="4" name="직사각형 3">
+            <a:extLst>
+              <a:ext uri="{FF2B5EF4-FFF2-40B4-BE49-F238E27FC236}">
+                <a16:creationId xmlns:a16="http://schemas.microsoft.com/office/drawing/2014/main" id="{DE00BCF4-2D7C-4F53-8B8A-85C54EBE8227}"/>
+              </a:ext>
+            </a:extLst>
+          </p:cNvPr>
+          <p:cNvSpPr/>
+          <p:nvPr/>
+        </p:nvSpPr>
+        <p:spPr>
+          <a:xfrm>
+            <a:off x="1567543" y="630230"/>
+            <a:ext cx="1663337" cy="2302491"/>
+          </a:xfrm>
+          <a:prstGeom prst="rect">
+            <a:avLst/>
+          </a:prstGeom>
+          <a:solidFill>
+            <a:schemeClr val="bg1"/>
+          </a:solidFill>
+          <a:ln w="19050">
+            <a:solidFill>
+              <a:schemeClr val="tx1"/>
+            </a:solidFill>
+          </a:ln>
+        </p:spPr>
+        <p:style>
+          <a:lnRef idx="2">
+            <a:schemeClr val="accent1">
+              <a:shade val="50000"/>
+            </a:schemeClr>
+          </a:lnRef>
+          <a:fillRef idx="1">
+            <a:schemeClr val="accent1"/>
+          </a:fillRef>
+          <a:effectRef idx="0">
+            <a:schemeClr val="accent1"/>
+          </a:effectRef>
+          <a:fontRef idx="minor">
+            <a:schemeClr val="lt1"/>
+          </a:fontRef>
+        </p:style>
+        <p:txBody>
+          <a:bodyPr rtlCol="0" anchor="ctr"/>
+          <a:lstStyle/>
+          <a:p>
+            <a:pPr algn="ctr"/>
+            <a:r>
+              <a:rPr lang="ko-KR" altLang="en-US" sz="1500">
+                <a:solidFill>
+                  <a:schemeClr val="tx1"/>
+                </a:solidFill>
+              </a:rPr>
+              <a:t>스마트폰</a:t>
+            </a:r>
+            <a:endParaRPr lang="en-US" altLang="ko-KR" sz="1500">
+              <a:solidFill>
+                <a:schemeClr val="tx1"/>
+              </a:solidFill>
+            </a:endParaRPr>
+          </a:p>
+          <a:p>
+            <a:pPr algn="ctr"/>
+            <a:r>
+              <a:rPr lang="ko-KR" altLang="en-US" sz="1500">
+                <a:solidFill>
+                  <a:schemeClr val="tx1"/>
+                </a:solidFill>
+              </a:rPr>
+              <a:t>어플리케이션</a:t>
+            </a:r>
+            <a:endParaRPr lang="en-US" altLang="ko-KR" sz="1500">
+              <a:solidFill>
+                <a:schemeClr val="tx1"/>
+              </a:solidFill>
+            </a:endParaRPr>
+          </a:p>
+          <a:p>
+            <a:pPr algn="ctr"/>
+            <a:r>
+              <a:rPr lang="ko-KR" altLang="en-US" sz="1500">
+                <a:solidFill>
+                  <a:schemeClr val="tx1"/>
+                </a:solidFill>
+              </a:rPr>
+              <a:t>구동</a:t>
+            </a:r>
+            <a:endParaRPr lang="en-US" altLang="ko-KR" sz="1500">
+              <a:solidFill>
+                <a:schemeClr val="tx1"/>
+              </a:solidFill>
+            </a:endParaRPr>
+          </a:p>
+        </p:txBody>
+      </p:sp>
+      <p:sp>
+        <p:nvSpPr>
+          <p:cNvPr id="5" name="직사각형 4">
+            <a:extLst>
+              <a:ext uri="{FF2B5EF4-FFF2-40B4-BE49-F238E27FC236}">
+                <a16:creationId xmlns:a16="http://schemas.microsoft.com/office/drawing/2014/main" id="{0F0DB3A1-1A00-44C7-BB66-CF5F9DFB4791}"/>
+              </a:ext>
+            </a:extLst>
+          </p:cNvPr>
+          <p:cNvSpPr/>
+          <p:nvPr/>
+        </p:nvSpPr>
+        <p:spPr>
+          <a:xfrm>
+            <a:off x="7637417" y="630230"/>
+            <a:ext cx="4458789" cy="5597540"/>
+          </a:xfrm>
+          <a:prstGeom prst="rect">
+            <a:avLst/>
+          </a:prstGeom>
+          <a:solidFill>
+            <a:schemeClr val="bg1"/>
+          </a:solidFill>
+          <a:ln w="19050">
+            <a:solidFill>
+              <a:schemeClr val="tx1"/>
+            </a:solidFill>
+          </a:ln>
+        </p:spPr>
+        <p:style>
+          <a:lnRef idx="2">
+            <a:schemeClr val="accent1">
+              <a:shade val="50000"/>
+            </a:schemeClr>
+          </a:lnRef>
+          <a:fillRef idx="1">
+            <a:schemeClr val="accent1"/>
+          </a:fillRef>
+          <a:effectRef idx="0">
+            <a:schemeClr val="accent1"/>
+          </a:effectRef>
+          <a:fontRef idx="minor">
+            <a:schemeClr val="lt1"/>
+          </a:fontRef>
+        </p:style>
+        <p:txBody>
+          <a:bodyPr rtlCol="0" anchor="ctr"/>
+          <a:lstStyle/>
+          <a:p>
+            <a:pPr algn="ctr"/>
+            <a:r>
+              <a:rPr lang="en-US" altLang="ko-KR">
+                <a:solidFill>
+                  <a:schemeClr val="tx1"/>
+                </a:solidFill>
+              </a:rPr>
+              <a:t>oneM2M </a:t>
+            </a:r>
+            <a:r>
+              <a:rPr lang="ko-KR" altLang="en-US">
+                <a:solidFill>
+                  <a:schemeClr val="tx1"/>
+                </a:solidFill>
+              </a:rPr>
+              <a:t>서비스 플랫폼</a:t>
+            </a:r>
+            <a:endParaRPr lang="en-US" altLang="ko-KR">
+              <a:solidFill>
+                <a:schemeClr val="tx1"/>
+              </a:solidFill>
+            </a:endParaRPr>
+          </a:p>
+          <a:p>
+            <a:pPr algn="ctr"/>
+            <a:r>
+              <a:rPr lang="en-US" altLang="ko-KR">
+                <a:solidFill>
+                  <a:schemeClr val="tx1"/>
+                </a:solidFill>
+              </a:rPr>
+              <a:t>(IN-CSE)</a:t>
+            </a:r>
+            <a:endParaRPr lang="ko-KR" altLang="en-US">
+              <a:solidFill>
+                <a:schemeClr val="tx1"/>
+              </a:solidFill>
+            </a:endParaRPr>
+          </a:p>
+        </p:txBody>
+      </p:sp>
+      <p:cxnSp>
+        <p:nvCxnSpPr>
+          <p:cNvPr id="7" name="직선 화살표 연결선 6">
+            <a:extLst>
+              <a:ext uri="{FF2B5EF4-FFF2-40B4-BE49-F238E27FC236}">
+                <a16:creationId xmlns:a16="http://schemas.microsoft.com/office/drawing/2014/main" id="{5BDEEBB4-3EC7-400A-ADAE-E05CB4E05A6D}"/>
+              </a:ext>
+            </a:extLst>
+          </p:cNvPr>
+          <p:cNvCxnSpPr/>
+          <p:nvPr/>
+        </p:nvCxnSpPr>
+        <p:spPr>
+          <a:xfrm>
+            <a:off x="3230880" y="1094994"/>
+            <a:ext cx="4406537" cy="0"/>
+          </a:xfrm>
+          <a:prstGeom prst="straightConnector1">
+            <a:avLst/>
+          </a:prstGeom>
+          <a:ln>
+            <a:solidFill>
+              <a:srgbClr val="FF0000"/>
+            </a:solidFill>
+            <a:tailEnd type="triangle"/>
+          </a:ln>
+        </p:spPr>
+        <p:style>
+          <a:lnRef idx="1">
+            <a:schemeClr val="accent1"/>
+          </a:lnRef>
+          <a:fillRef idx="0">
+            <a:schemeClr val="accent1"/>
+          </a:fillRef>
+          <a:effectRef idx="0">
+            <a:schemeClr val="accent1"/>
+          </a:effectRef>
+          <a:fontRef idx="minor">
+            <a:schemeClr val="tx1"/>
+          </a:fontRef>
+        </p:style>
+      </p:cxnSp>
+      <p:sp>
+        <p:nvSpPr>
+          <p:cNvPr id="8" name="TextBox 7">
+            <a:extLst>
+              <a:ext uri="{FF2B5EF4-FFF2-40B4-BE49-F238E27FC236}">
+                <a16:creationId xmlns:a16="http://schemas.microsoft.com/office/drawing/2014/main" id="{2B0015B8-A386-4C0F-A0F1-34CB5C43A87B}"/>
+              </a:ext>
+            </a:extLst>
+          </p:cNvPr>
+          <p:cNvSpPr txBox="1"/>
+          <p:nvPr/>
+        </p:nvSpPr>
+        <p:spPr>
+          <a:xfrm>
+            <a:off x="4214948" y="651639"/>
+            <a:ext cx="2438400" cy="369332"/>
+          </a:xfrm>
+          <a:prstGeom prst="rect">
+            <a:avLst/>
+          </a:prstGeom>
+          <a:noFill/>
+        </p:spPr>
+        <p:txBody>
+          <a:bodyPr wrap="square" rtlCol="0">
+            <a:spAutoFit/>
+          </a:bodyPr>
+          <a:lstStyle/>
+          <a:p>
+            <a:r>
+              <a:rPr lang="ko-KR" altLang="en-US"/>
+              <a:t>사용자 컨테이너 생성</a:t>
+            </a:r>
+          </a:p>
+        </p:txBody>
+      </p:sp>
+      <p:cxnSp>
+        <p:nvCxnSpPr>
+          <p:cNvPr id="9" name="직선 화살표 연결선 8">
+            <a:extLst>
+              <a:ext uri="{FF2B5EF4-FFF2-40B4-BE49-F238E27FC236}">
+                <a16:creationId xmlns:a16="http://schemas.microsoft.com/office/drawing/2014/main" id="{85A40380-191E-4E2D-B16A-32F462A34152}"/>
+              </a:ext>
+            </a:extLst>
+          </p:cNvPr>
+          <p:cNvCxnSpPr/>
+          <p:nvPr/>
+        </p:nvCxnSpPr>
+        <p:spPr>
+          <a:xfrm>
+            <a:off x="3230880" y="1974560"/>
+            <a:ext cx="4406537" cy="0"/>
+          </a:xfrm>
+          <a:prstGeom prst="straightConnector1">
+            <a:avLst/>
+          </a:prstGeom>
+          <a:ln>
+            <a:solidFill>
+              <a:srgbClr val="FF0000"/>
+            </a:solidFill>
+            <a:tailEnd type="triangle"/>
+          </a:ln>
+        </p:spPr>
+        <p:style>
+          <a:lnRef idx="1">
+            <a:schemeClr val="accent1"/>
+          </a:lnRef>
+          <a:fillRef idx="0">
+            <a:schemeClr val="accent1"/>
+          </a:fillRef>
+          <a:effectRef idx="0">
+            <a:schemeClr val="accent1"/>
+          </a:effectRef>
+          <a:fontRef idx="minor">
+            <a:schemeClr val="tx1"/>
+          </a:fontRef>
+        </p:style>
+      </p:cxnSp>
+      <p:sp>
+        <p:nvSpPr>
+          <p:cNvPr id="10" name="TextBox 9">
+            <a:extLst>
+              <a:ext uri="{FF2B5EF4-FFF2-40B4-BE49-F238E27FC236}">
+                <a16:creationId xmlns:a16="http://schemas.microsoft.com/office/drawing/2014/main" id="{B8B3F7A9-91D2-434E-9191-3A24FE01B5B4}"/>
+              </a:ext>
+            </a:extLst>
+          </p:cNvPr>
+          <p:cNvSpPr txBox="1"/>
+          <p:nvPr/>
+        </p:nvSpPr>
+        <p:spPr>
+          <a:xfrm>
+            <a:off x="4214948" y="1293393"/>
+            <a:ext cx="2438400" cy="646331"/>
+          </a:xfrm>
+          <a:prstGeom prst="rect">
+            <a:avLst/>
+          </a:prstGeom>
+          <a:noFill/>
+        </p:spPr>
+        <p:txBody>
+          <a:bodyPr wrap="square" rtlCol="0">
+            <a:spAutoFit/>
+          </a:bodyPr>
+          <a:lstStyle/>
+          <a:p>
+            <a:pPr algn="ctr"/>
+            <a:r>
+              <a:rPr lang="ko-KR" altLang="en-US"/>
+              <a:t>주문 품목</a:t>
+            </a:r>
+            <a:r>
+              <a:rPr lang="en-US" altLang="ko-KR"/>
+              <a:t>, </a:t>
+            </a:r>
+            <a:r>
+              <a:rPr lang="ko-KR" altLang="en-US"/>
+              <a:t>주문 현황 컨테이너 생성</a:t>
+            </a:r>
+          </a:p>
+        </p:txBody>
+      </p:sp>
+      <p:cxnSp>
+        <p:nvCxnSpPr>
+          <p:cNvPr id="11" name="직선 화살표 연결선 10">
+            <a:extLst>
+              <a:ext uri="{FF2B5EF4-FFF2-40B4-BE49-F238E27FC236}">
+                <a16:creationId xmlns:a16="http://schemas.microsoft.com/office/drawing/2014/main" id="{F8C879CF-1CAA-4536-8CFD-F640D7B63A1B}"/>
+              </a:ext>
+            </a:extLst>
+          </p:cNvPr>
+          <p:cNvCxnSpPr/>
+          <p:nvPr/>
+        </p:nvCxnSpPr>
+        <p:spPr>
+          <a:xfrm>
+            <a:off x="3230880" y="4883442"/>
+            <a:ext cx="4406537" cy="0"/>
+          </a:xfrm>
+          <a:prstGeom prst="straightConnector1">
+            <a:avLst/>
+          </a:prstGeom>
+          <a:ln>
+            <a:solidFill>
+              <a:srgbClr val="FF0000"/>
+            </a:solidFill>
+            <a:tailEnd type="triangle"/>
+          </a:ln>
+        </p:spPr>
+        <p:style>
+          <a:lnRef idx="1">
+            <a:schemeClr val="accent1"/>
+          </a:lnRef>
+          <a:fillRef idx="0">
+            <a:schemeClr val="accent1"/>
+          </a:fillRef>
+          <a:effectRef idx="0">
+            <a:schemeClr val="accent1"/>
+          </a:effectRef>
+          <a:fontRef idx="minor">
+            <a:schemeClr val="tx1"/>
+          </a:fontRef>
+        </p:style>
+      </p:cxnSp>
+      <p:sp>
+        <p:nvSpPr>
+          <p:cNvPr id="12" name="TextBox 11">
+            <a:extLst>
+              <a:ext uri="{FF2B5EF4-FFF2-40B4-BE49-F238E27FC236}">
+                <a16:creationId xmlns:a16="http://schemas.microsoft.com/office/drawing/2014/main" id="{DD6E3D55-9715-4842-94FB-73B7E709927A}"/>
+              </a:ext>
+            </a:extLst>
+          </p:cNvPr>
+          <p:cNvSpPr txBox="1"/>
+          <p:nvPr/>
+        </p:nvSpPr>
+        <p:spPr>
+          <a:xfrm>
+            <a:off x="4214948" y="4202275"/>
+            <a:ext cx="2438400" cy="646331"/>
+          </a:xfrm>
+          <a:prstGeom prst="rect">
+            <a:avLst/>
+          </a:prstGeom>
+          <a:noFill/>
+        </p:spPr>
+        <p:txBody>
+          <a:bodyPr wrap="square" rtlCol="0">
+            <a:spAutoFit/>
+          </a:bodyPr>
+          <a:lstStyle/>
+          <a:p>
+            <a:pPr algn="ctr"/>
+            <a:r>
+              <a:rPr lang="ko-KR" altLang="en-US"/>
+              <a:t>주문 품목</a:t>
+            </a:r>
+            <a:r>
+              <a:rPr lang="en-US" altLang="ko-KR"/>
+              <a:t>, </a:t>
+            </a:r>
+            <a:r>
+              <a:rPr lang="ko-KR" altLang="en-US"/>
+              <a:t>주문 현황 </a:t>
+            </a:r>
+            <a:r>
+              <a:rPr lang="en-US" altLang="ko-KR"/>
+              <a:t>contentInstance</a:t>
+            </a:r>
+            <a:r>
+              <a:rPr lang="ko-KR" altLang="en-US"/>
+              <a:t> 생성</a:t>
+            </a:r>
+          </a:p>
+        </p:txBody>
+      </p:sp>
+      <p:cxnSp>
+        <p:nvCxnSpPr>
+          <p:cNvPr id="13" name="직선 화살표 연결선 12">
+            <a:extLst>
+              <a:ext uri="{FF2B5EF4-FFF2-40B4-BE49-F238E27FC236}">
+                <a16:creationId xmlns:a16="http://schemas.microsoft.com/office/drawing/2014/main" id="{EEAE0F9E-9929-41EB-A008-99C381580978}"/>
+              </a:ext>
+            </a:extLst>
+          </p:cNvPr>
+          <p:cNvCxnSpPr/>
+          <p:nvPr/>
+        </p:nvCxnSpPr>
+        <p:spPr>
+          <a:xfrm>
+            <a:off x="3230880" y="5763006"/>
+            <a:ext cx="4406537" cy="0"/>
+          </a:xfrm>
+          <a:prstGeom prst="straightConnector1">
+            <a:avLst/>
+          </a:prstGeom>
+          <a:ln>
+            <a:solidFill>
+              <a:srgbClr val="FF0000"/>
+            </a:solidFill>
+            <a:tailEnd type="triangle"/>
+          </a:ln>
+        </p:spPr>
+        <p:style>
+          <a:lnRef idx="1">
+            <a:schemeClr val="accent1"/>
+          </a:lnRef>
+          <a:fillRef idx="0">
+            <a:schemeClr val="accent1"/>
+          </a:fillRef>
+          <a:effectRef idx="0">
+            <a:schemeClr val="accent1"/>
+          </a:effectRef>
+          <a:fontRef idx="minor">
+            <a:schemeClr val="tx1"/>
+          </a:fontRef>
+        </p:style>
+      </p:cxnSp>
+      <p:sp>
+        <p:nvSpPr>
+          <p:cNvPr id="14" name="TextBox 13">
+            <a:extLst>
+              <a:ext uri="{FF2B5EF4-FFF2-40B4-BE49-F238E27FC236}">
+                <a16:creationId xmlns:a16="http://schemas.microsoft.com/office/drawing/2014/main" id="{5BCBCF2F-1CBB-43DE-937A-BB9EA63761E4}"/>
+              </a:ext>
+            </a:extLst>
+          </p:cNvPr>
+          <p:cNvSpPr txBox="1"/>
+          <p:nvPr/>
+        </p:nvSpPr>
+        <p:spPr>
+          <a:xfrm>
+            <a:off x="4214948" y="5358837"/>
+            <a:ext cx="2438400" cy="369332"/>
+          </a:xfrm>
+          <a:prstGeom prst="rect">
+            <a:avLst/>
+          </a:prstGeom>
+          <a:noFill/>
+        </p:spPr>
+        <p:txBody>
+          <a:bodyPr wrap="square" rtlCol="0">
+            <a:spAutoFit/>
+          </a:bodyPr>
+          <a:lstStyle/>
+          <a:p>
+            <a:pPr algn="ctr"/>
+            <a:r>
+              <a:rPr lang="ko-KR" altLang="en-US"/>
+              <a:t>최근 주문 현황 검색</a:t>
+            </a:r>
+            <a:endParaRPr lang="en-US" altLang="ko-KR"/>
+          </a:p>
+        </p:txBody>
+      </p:sp>
+      <p:sp>
+        <p:nvSpPr>
+          <p:cNvPr id="15" name="직사각형 14">
+            <a:extLst>
+              <a:ext uri="{FF2B5EF4-FFF2-40B4-BE49-F238E27FC236}">
+                <a16:creationId xmlns:a16="http://schemas.microsoft.com/office/drawing/2014/main" id="{FE8A550A-D41D-487B-8ED4-6F30ABC84F4B}"/>
+              </a:ext>
+            </a:extLst>
+          </p:cNvPr>
+          <p:cNvSpPr/>
+          <p:nvPr/>
+        </p:nvSpPr>
+        <p:spPr>
+          <a:xfrm>
+            <a:off x="1567543" y="3925279"/>
+            <a:ext cx="1663337" cy="2302491"/>
+          </a:xfrm>
+          <a:prstGeom prst="rect">
+            <a:avLst/>
+          </a:prstGeom>
+          <a:solidFill>
+            <a:schemeClr val="bg1"/>
+          </a:solidFill>
+          <a:ln w="19050">
+            <a:solidFill>
+              <a:schemeClr val="tx1"/>
+            </a:solidFill>
+          </a:ln>
+        </p:spPr>
+        <p:style>
+          <a:lnRef idx="2">
+            <a:schemeClr val="accent1">
+              <a:shade val="50000"/>
+            </a:schemeClr>
+          </a:lnRef>
+          <a:fillRef idx="1">
+            <a:schemeClr val="accent1"/>
+          </a:fillRef>
+          <a:effectRef idx="0">
+            <a:schemeClr val="accent1"/>
+          </a:effectRef>
+          <a:fontRef idx="minor">
+            <a:schemeClr val="lt1"/>
+          </a:fontRef>
+        </p:style>
+        <p:txBody>
+          <a:bodyPr rtlCol="0" anchor="ctr"/>
+          <a:lstStyle/>
+          <a:p>
+            <a:pPr algn="ctr"/>
+            <a:r>
+              <a:rPr lang="ko-KR" altLang="en-US" sz="1500">
+                <a:solidFill>
+                  <a:schemeClr val="tx1"/>
+                </a:solidFill>
+              </a:rPr>
+              <a:t>스마트폰</a:t>
+            </a:r>
+            <a:endParaRPr lang="en-US" altLang="ko-KR" sz="1500">
+              <a:solidFill>
+                <a:schemeClr val="tx1"/>
+              </a:solidFill>
+            </a:endParaRPr>
+          </a:p>
+          <a:p>
+            <a:pPr algn="ctr"/>
+            <a:r>
+              <a:rPr lang="ko-KR" altLang="en-US" sz="1500">
+                <a:solidFill>
+                  <a:schemeClr val="tx1"/>
+                </a:solidFill>
+              </a:rPr>
+              <a:t>어플리케이션</a:t>
+            </a:r>
+            <a:endParaRPr lang="en-US" altLang="ko-KR" sz="1500">
+              <a:solidFill>
+                <a:schemeClr val="tx1"/>
+              </a:solidFill>
+            </a:endParaRPr>
+          </a:p>
+          <a:p>
+            <a:pPr algn="ctr"/>
+            <a:r>
+              <a:rPr lang="ko-KR" altLang="en-US" sz="1500">
+                <a:solidFill>
+                  <a:schemeClr val="tx1"/>
+                </a:solidFill>
+              </a:rPr>
+              <a:t>주문 버튼 클릭</a:t>
+            </a:r>
+            <a:endParaRPr lang="en-US" altLang="ko-KR" sz="1500">
+              <a:solidFill>
+                <a:schemeClr val="tx1"/>
+              </a:solidFill>
+            </a:endParaRPr>
+          </a:p>
+        </p:txBody>
+      </p:sp>
+    </p:spTree>
+    <p:extLst>
+      <p:ext uri="{BB962C8B-B14F-4D97-AF65-F5344CB8AC3E}">
+        <p14:creationId xmlns:p14="http://schemas.microsoft.com/office/powerpoint/2010/main" val="2085779566"/>
+      </p:ext>
+    </p:extLst>
+  </p:cSld>
+  <p:clrMapOvr>
+    <a:masterClrMapping/>
+  </p:clrMapOvr>
+</p:sld>
+</file>
+
+<file path=ppt/slides/slide3.xml><?xml version="1.0" encoding="utf-8"?>
+<p:sld xmlns:a="http://schemas.openxmlformats.org/drawingml/2006/main" xmlns:r="http://schemas.openxmlformats.org/officeDocument/2006/relationships" xmlns:p="http://schemas.openxmlformats.org/presentationml/2006/main">
+  <p:cSld>
+    <p:spTree>
+      <p:nvGrpSpPr>
+        <p:cNvPr id="1" name=""/>
+        <p:cNvGrpSpPr/>
+        <p:nvPr/>
+      </p:nvGrpSpPr>
+      <p:grpSpPr>
+        <a:xfrm>
+          <a:off x="0" y="0"/>
+          <a:ext cx="0" cy="0"/>
+          <a:chOff x="0" y="0"/>
+          <a:chExt cx="0" cy="0"/>
+        </a:xfrm>
+      </p:grpSpPr>
+      <p:sp>
+        <p:nvSpPr>
+          <p:cNvPr id="2" name="직사각형 1">
+            <a:extLst>
+              <a:ext uri="{FF2B5EF4-FFF2-40B4-BE49-F238E27FC236}">
+                <a16:creationId xmlns:a16="http://schemas.microsoft.com/office/drawing/2014/main" id="{49676D6A-F265-40A2-AA15-066E62EC6565}"/>
+              </a:ext>
+            </a:extLst>
+          </p:cNvPr>
+          <p:cNvSpPr/>
+          <p:nvPr/>
+        </p:nvSpPr>
+        <p:spPr>
+          <a:xfrm>
+            <a:off x="3553097" y="1288869"/>
+            <a:ext cx="1628503" cy="418011"/>
+          </a:xfrm>
+          <a:prstGeom prst="rect">
+            <a:avLst/>
+          </a:prstGeom>
+          <a:solidFill>
+            <a:schemeClr val="bg1"/>
+          </a:solidFill>
+          <a:ln>
+            <a:solidFill>
+              <a:schemeClr val="tx1"/>
+            </a:solidFill>
+          </a:ln>
+        </p:spPr>
+        <p:style>
+          <a:lnRef idx="2">
+            <a:schemeClr val="accent1">
+              <a:shade val="50000"/>
+            </a:schemeClr>
+          </a:lnRef>
+          <a:fillRef idx="1">
+            <a:schemeClr val="accent1"/>
+          </a:fillRef>
+          <a:effectRef idx="0">
+            <a:schemeClr val="accent1"/>
+          </a:effectRef>
+          <a:fontRef idx="minor">
+            <a:schemeClr val="lt1"/>
+          </a:fontRef>
+        </p:style>
+        <p:txBody>
+          <a:bodyPr rtlCol="0" anchor="ctr"/>
+          <a:lstStyle/>
+          <a:p>
+            <a:pPr algn="ctr"/>
+            <a:r>
+              <a:rPr lang="en-US" altLang="ko-KR">
+                <a:solidFill>
+                  <a:schemeClr val="tx1"/>
+                </a:solidFill>
+              </a:rPr>
+              <a:t>IN-AE</a:t>
+            </a:r>
+            <a:endParaRPr lang="ko-KR" altLang="en-US">
+              <a:solidFill>
+                <a:schemeClr val="tx1"/>
+              </a:solidFill>
+            </a:endParaRPr>
+          </a:p>
+        </p:txBody>
+      </p:sp>
+      <p:sp>
+        <p:nvSpPr>
+          <p:cNvPr id="15" name="직사각형 14">
+            <a:extLst>
+              <a:ext uri="{FF2B5EF4-FFF2-40B4-BE49-F238E27FC236}">
+                <a16:creationId xmlns:a16="http://schemas.microsoft.com/office/drawing/2014/main" id="{EA66211C-1669-4DCF-BB92-C2D2144FD9FB}"/>
+              </a:ext>
+            </a:extLst>
+          </p:cNvPr>
+          <p:cNvSpPr/>
+          <p:nvPr/>
+        </p:nvSpPr>
+        <p:spPr>
+          <a:xfrm>
+            <a:off x="4367348" y="2020389"/>
+            <a:ext cx="1628503" cy="418011"/>
+          </a:xfrm>
+          <a:prstGeom prst="rect">
+            <a:avLst/>
+          </a:prstGeom>
+          <a:solidFill>
+            <a:schemeClr val="bg1"/>
+          </a:solidFill>
+          <a:ln>
+            <a:solidFill>
+              <a:schemeClr val="tx1"/>
+            </a:solidFill>
+          </a:ln>
+        </p:spPr>
+        <p:style>
+          <a:lnRef idx="2">
+            <a:schemeClr val="accent1">
+              <a:shade val="50000"/>
+            </a:schemeClr>
+          </a:lnRef>
+          <a:fillRef idx="1">
+            <a:schemeClr val="accent1"/>
+          </a:fillRef>
+          <a:effectRef idx="0">
+            <a:schemeClr val="accent1"/>
+          </a:effectRef>
+          <a:fontRef idx="minor">
+            <a:schemeClr val="lt1"/>
+          </a:fontRef>
+        </p:style>
+        <p:txBody>
+          <a:bodyPr rtlCol="0" anchor="ctr"/>
+          <a:lstStyle/>
+          <a:p>
+            <a:pPr algn="ctr"/>
+            <a:r>
+              <a:rPr lang="en-US" altLang="ko-KR">
+                <a:solidFill>
+                  <a:schemeClr val="tx1"/>
+                </a:solidFill>
+              </a:rPr>
+              <a:t>user1(Cnt)</a:t>
+            </a:r>
+            <a:endParaRPr lang="ko-KR" altLang="en-US">
+              <a:solidFill>
+                <a:schemeClr val="tx1"/>
+              </a:solidFill>
+            </a:endParaRPr>
+          </a:p>
+        </p:txBody>
+      </p:sp>
+      <p:sp>
+        <p:nvSpPr>
+          <p:cNvPr id="16" name="직사각형 15">
+            <a:extLst>
+              <a:ext uri="{FF2B5EF4-FFF2-40B4-BE49-F238E27FC236}">
+                <a16:creationId xmlns:a16="http://schemas.microsoft.com/office/drawing/2014/main" id="{12BDF830-1B5A-49DB-9B9D-AFB2AE4A36E0}"/>
+              </a:ext>
+            </a:extLst>
+          </p:cNvPr>
+          <p:cNvSpPr/>
+          <p:nvPr/>
+        </p:nvSpPr>
+        <p:spPr>
+          <a:xfrm>
+            <a:off x="5181599" y="2751909"/>
+            <a:ext cx="1628503" cy="418011"/>
+          </a:xfrm>
+          <a:prstGeom prst="rect">
+            <a:avLst/>
+          </a:prstGeom>
+          <a:solidFill>
+            <a:schemeClr val="bg1"/>
+          </a:solidFill>
+          <a:ln>
+            <a:solidFill>
+              <a:schemeClr val="tx1"/>
+            </a:solidFill>
+          </a:ln>
+        </p:spPr>
+        <p:style>
+          <a:lnRef idx="2">
+            <a:schemeClr val="accent1">
+              <a:shade val="50000"/>
+            </a:schemeClr>
+          </a:lnRef>
+          <a:fillRef idx="1">
+            <a:schemeClr val="accent1"/>
+          </a:fillRef>
+          <a:effectRef idx="0">
+            <a:schemeClr val="accent1"/>
+          </a:effectRef>
+          <a:fontRef idx="minor">
+            <a:schemeClr val="lt1"/>
+          </a:fontRef>
+        </p:style>
+        <p:txBody>
+          <a:bodyPr rtlCol="0" anchor="ctr"/>
+          <a:lstStyle/>
+          <a:p>
+            <a:pPr algn="ctr"/>
+            <a:r>
+              <a:rPr lang="en-US" altLang="ko-KR">
+                <a:solidFill>
+                  <a:schemeClr val="tx1"/>
+                </a:solidFill>
+              </a:rPr>
+              <a:t>product(Cnt)</a:t>
+            </a:r>
+            <a:endParaRPr lang="ko-KR" altLang="en-US">
+              <a:solidFill>
+                <a:schemeClr val="tx1"/>
+              </a:solidFill>
+            </a:endParaRPr>
+          </a:p>
+        </p:txBody>
+      </p:sp>
+      <p:sp>
+        <p:nvSpPr>
+          <p:cNvPr id="17" name="직사각형 16">
+            <a:extLst>
+              <a:ext uri="{FF2B5EF4-FFF2-40B4-BE49-F238E27FC236}">
+                <a16:creationId xmlns:a16="http://schemas.microsoft.com/office/drawing/2014/main" id="{16944651-546E-4E54-8591-347605C5647E}"/>
+              </a:ext>
+            </a:extLst>
+          </p:cNvPr>
+          <p:cNvSpPr/>
+          <p:nvPr/>
+        </p:nvSpPr>
+        <p:spPr>
+          <a:xfrm>
+            <a:off x="5181599" y="3483429"/>
+            <a:ext cx="1628503" cy="418011"/>
+          </a:xfrm>
+          <a:prstGeom prst="rect">
+            <a:avLst/>
+          </a:prstGeom>
+          <a:solidFill>
+            <a:schemeClr val="bg1"/>
+          </a:solidFill>
+          <a:ln>
+            <a:solidFill>
+              <a:schemeClr val="tx1"/>
+            </a:solidFill>
+          </a:ln>
+        </p:spPr>
+        <p:style>
+          <a:lnRef idx="2">
+            <a:schemeClr val="accent1">
+              <a:shade val="50000"/>
+            </a:schemeClr>
+          </a:lnRef>
+          <a:fillRef idx="1">
+            <a:schemeClr val="accent1"/>
+          </a:fillRef>
+          <a:effectRef idx="0">
+            <a:schemeClr val="accent1"/>
+          </a:effectRef>
+          <a:fontRef idx="minor">
+            <a:schemeClr val="lt1"/>
+          </a:fontRef>
+        </p:style>
+        <p:txBody>
+          <a:bodyPr rtlCol="0" anchor="ctr"/>
+          <a:lstStyle/>
+          <a:p>
+            <a:pPr algn="ctr"/>
+            <a:r>
+              <a:rPr lang="en-US" altLang="ko-KR">
+                <a:solidFill>
+                  <a:schemeClr val="tx1"/>
+                </a:solidFill>
+              </a:rPr>
+              <a:t>order(Cnt)</a:t>
+            </a:r>
+            <a:endParaRPr lang="ko-KR" altLang="en-US">
+              <a:solidFill>
+                <a:schemeClr val="tx1"/>
+              </a:solidFill>
+            </a:endParaRPr>
+          </a:p>
+        </p:txBody>
+      </p:sp>
+      <p:cxnSp>
+        <p:nvCxnSpPr>
+          <p:cNvPr id="6" name="연결선: 꺾임 5">
+            <a:extLst>
+              <a:ext uri="{FF2B5EF4-FFF2-40B4-BE49-F238E27FC236}">
+                <a16:creationId xmlns:a16="http://schemas.microsoft.com/office/drawing/2014/main" id="{8D657B99-DE1C-4ECC-8948-86C8659B4668}"/>
+              </a:ext>
+            </a:extLst>
+          </p:cNvPr>
+          <p:cNvCxnSpPr>
+            <a:endCxn id="15" idx="1"/>
+          </p:cNvCxnSpPr>
+          <p:nvPr/>
+        </p:nvCxnSpPr>
+        <p:spPr>
+          <a:xfrm rot="16200000" flipH="1">
+            <a:off x="3886200" y="1748246"/>
+            <a:ext cx="522515" cy="439782"/>
+          </a:xfrm>
+          <a:prstGeom prst="bentConnector2">
+            <a:avLst/>
+          </a:prstGeom>
+          <a:ln w="19050">
+            <a:solidFill>
+              <a:schemeClr val="tx1"/>
+            </a:solidFill>
+            <a:tailEnd type="triangle"/>
+          </a:ln>
+        </p:spPr>
+        <p:style>
+          <a:lnRef idx="1">
+            <a:schemeClr val="accent1"/>
+          </a:lnRef>
+          <a:fillRef idx="0">
+            <a:schemeClr val="accent1"/>
+          </a:fillRef>
+          <a:effectRef idx="0">
+            <a:schemeClr val="accent1"/>
+          </a:effectRef>
+          <a:fontRef idx="minor">
+            <a:schemeClr val="tx1"/>
+          </a:fontRef>
+        </p:style>
+      </p:cxnSp>
+      <p:cxnSp>
+        <p:nvCxnSpPr>
+          <p:cNvPr id="18" name="연결선: 꺾임 17">
+            <a:extLst>
+              <a:ext uri="{FF2B5EF4-FFF2-40B4-BE49-F238E27FC236}">
+                <a16:creationId xmlns:a16="http://schemas.microsoft.com/office/drawing/2014/main" id="{DC8D08FA-4399-484A-ACD3-D6D9B7C5CC4E}"/>
+              </a:ext>
+            </a:extLst>
+          </p:cNvPr>
+          <p:cNvCxnSpPr>
+            <a:cxnSpLocks/>
+            <a:endCxn id="16" idx="1"/>
+          </p:cNvCxnSpPr>
+          <p:nvPr/>
+        </p:nvCxnSpPr>
+        <p:spPr>
+          <a:xfrm rot="16200000" flipH="1">
+            <a:off x="4700450" y="2479766"/>
+            <a:ext cx="522516" cy="439781"/>
+          </a:xfrm>
+          <a:prstGeom prst="bentConnector2">
+            <a:avLst/>
+          </a:prstGeom>
+          <a:ln w="19050">
+            <a:solidFill>
+              <a:schemeClr val="tx1"/>
+            </a:solidFill>
+            <a:tailEnd type="triangle"/>
+          </a:ln>
+        </p:spPr>
+        <p:style>
+          <a:lnRef idx="1">
+            <a:schemeClr val="accent1"/>
+          </a:lnRef>
+          <a:fillRef idx="0">
+            <a:schemeClr val="accent1"/>
+          </a:fillRef>
+          <a:effectRef idx="0">
+            <a:schemeClr val="accent1"/>
+          </a:effectRef>
+          <a:fontRef idx="minor">
+            <a:schemeClr val="tx1"/>
+          </a:fontRef>
+        </p:style>
+      </p:cxnSp>
+      <p:cxnSp>
+        <p:nvCxnSpPr>
+          <p:cNvPr id="25" name="연결선: 꺾임 24">
+            <a:extLst>
+              <a:ext uri="{FF2B5EF4-FFF2-40B4-BE49-F238E27FC236}">
+                <a16:creationId xmlns:a16="http://schemas.microsoft.com/office/drawing/2014/main" id="{41C39F62-3E65-419C-BB51-6F566E8C7E9E}"/>
+              </a:ext>
+            </a:extLst>
+          </p:cNvPr>
+          <p:cNvCxnSpPr>
+            <a:cxnSpLocks/>
+            <a:endCxn id="17" idx="1"/>
+          </p:cNvCxnSpPr>
+          <p:nvPr/>
+        </p:nvCxnSpPr>
+        <p:spPr>
+          <a:xfrm rot="16200000" flipH="1">
+            <a:off x="4329249" y="2840085"/>
+            <a:ext cx="1256212" cy="448488"/>
+          </a:xfrm>
+          <a:prstGeom prst="bentConnector2">
+            <a:avLst/>
+          </a:prstGeom>
+          <a:ln w="19050">
+            <a:solidFill>
+              <a:schemeClr val="tx1"/>
+            </a:solidFill>
+            <a:tailEnd type="triangle"/>
+          </a:ln>
+        </p:spPr>
+        <p:style>
+          <a:lnRef idx="1">
+            <a:schemeClr val="accent1"/>
+          </a:lnRef>
+          <a:fillRef idx="0">
+            <a:schemeClr val="accent1"/>
+          </a:fillRef>
+          <a:effectRef idx="0">
+            <a:schemeClr val="accent1"/>
+          </a:effectRef>
+          <a:fontRef idx="minor">
+            <a:schemeClr val="tx1"/>
+          </a:fontRef>
+        </p:style>
+      </p:cxnSp>
+    </p:spTree>
+    <p:extLst>
+      <p:ext uri="{BB962C8B-B14F-4D97-AF65-F5344CB8AC3E}">
+        <p14:creationId xmlns:p14="http://schemas.microsoft.com/office/powerpoint/2010/main" val="1556599025"/>
+      </p:ext>
+    </p:extLst>
+  </p:cSld>
+  <p:clrMapOvr>
+    <a:masterClrMapping/>
+  </p:clrMapOvr>
+</p:sld>
+</file>
+
 <file path=ppt/theme/theme1.xml><?xml version="1.0" encoding="utf-8"?>
 <a:theme xmlns:a="http://schemas.openxmlformats.org/drawingml/2006/main" name="Office 테마">
   <a:themeElements>

</xml_diff>